<commit_message>
WBS + résumé en anglais
</commit_message>
<xml_diff>
--- a/Documentation/cahierDesCharges/WBS.pptx
+++ b/Documentation/cahierDesCharges/WBS.pptx
@@ -260,7 +260,7 @@
           <a:p>
             <a:fld id="{A69FEF66-3E5D-456B-B12D-7D7311CE5BD0}" type="datetimeFigureOut">
               <a:rPr lang="fr-FR" smtClean="0"/>
-              <a:t>17/01/2021</a:t>
+              <a:t>15/03/2021</a:t>
             </a:fld>
             <a:endParaRPr lang="fr-FR"/>
           </a:p>
@@ -458,7 +458,7 @@
           <a:p>
             <a:fld id="{A69FEF66-3E5D-456B-B12D-7D7311CE5BD0}" type="datetimeFigureOut">
               <a:rPr lang="fr-FR" smtClean="0"/>
-              <a:t>17/01/2021</a:t>
+              <a:t>15/03/2021</a:t>
             </a:fld>
             <a:endParaRPr lang="fr-FR"/>
           </a:p>
@@ -666,7 +666,7 @@
           <a:p>
             <a:fld id="{A69FEF66-3E5D-456B-B12D-7D7311CE5BD0}" type="datetimeFigureOut">
               <a:rPr lang="fr-FR" smtClean="0"/>
-              <a:t>17/01/2021</a:t>
+              <a:t>15/03/2021</a:t>
             </a:fld>
             <a:endParaRPr lang="fr-FR"/>
           </a:p>
@@ -864,7 +864,7 @@
           <a:p>
             <a:fld id="{A69FEF66-3E5D-456B-B12D-7D7311CE5BD0}" type="datetimeFigureOut">
               <a:rPr lang="fr-FR" smtClean="0"/>
-              <a:t>17/01/2021</a:t>
+              <a:t>15/03/2021</a:t>
             </a:fld>
             <a:endParaRPr lang="fr-FR"/>
           </a:p>
@@ -1139,7 +1139,7 @@
           <a:p>
             <a:fld id="{A69FEF66-3E5D-456B-B12D-7D7311CE5BD0}" type="datetimeFigureOut">
               <a:rPr lang="fr-FR" smtClean="0"/>
-              <a:t>17/01/2021</a:t>
+              <a:t>15/03/2021</a:t>
             </a:fld>
             <a:endParaRPr lang="fr-FR"/>
           </a:p>
@@ -1404,7 +1404,7 @@
           <a:p>
             <a:fld id="{A69FEF66-3E5D-456B-B12D-7D7311CE5BD0}" type="datetimeFigureOut">
               <a:rPr lang="fr-FR" smtClean="0"/>
-              <a:t>17/01/2021</a:t>
+              <a:t>15/03/2021</a:t>
             </a:fld>
             <a:endParaRPr lang="fr-FR"/>
           </a:p>
@@ -1816,7 +1816,7 @@
           <a:p>
             <a:fld id="{A69FEF66-3E5D-456B-B12D-7D7311CE5BD0}" type="datetimeFigureOut">
               <a:rPr lang="fr-FR" smtClean="0"/>
-              <a:t>17/01/2021</a:t>
+              <a:t>15/03/2021</a:t>
             </a:fld>
             <a:endParaRPr lang="fr-FR"/>
           </a:p>
@@ -1957,7 +1957,7 @@
           <a:p>
             <a:fld id="{A69FEF66-3E5D-456B-B12D-7D7311CE5BD0}" type="datetimeFigureOut">
               <a:rPr lang="fr-FR" smtClean="0"/>
-              <a:t>17/01/2021</a:t>
+              <a:t>15/03/2021</a:t>
             </a:fld>
             <a:endParaRPr lang="fr-FR"/>
           </a:p>
@@ -2070,7 +2070,7 @@
           <a:p>
             <a:fld id="{A69FEF66-3E5D-456B-B12D-7D7311CE5BD0}" type="datetimeFigureOut">
               <a:rPr lang="fr-FR" smtClean="0"/>
-              <a:t>17/01/2021</a:t>
+              <a:t>15/03/2021</a:t>
             </a:fld>
             <a:endParaRPr lang="fr-FR"/>
           </a:p>
@@ -2381,7 +2381,7 @@
           <a:p>
             <a:fld id="{A69FEF66-3E5D-456B-B12D-7D7311CE5BD0}" type="datetimeFigureOut">
               <a:rPr lang="fr-FR" smtClean="0"/>
-              <a:t>17/01/2021</a:t>
+              <a:t>15/03/2021</a:t>
             </a:fld>
             <a:endParaRPr lang="fr-FR"/>
           </a:p>
@@ -2669,7 +2669,7 @@
           <a:p>
             <a:fld id="{A69FEF66-3E5D-456B-B12D-7D7311CE5BD0}" type="datetimeFigureOut">
               <a:rPr lang="fr-FR" smtClean="0"/>
-              <a:t>17/01/2021</a:t>
+              <a:t>15/03/2021</a:t>
             </a:fld>
             <a:endParaRPr lang="fr-FR"/>
           </a:p>
@@ -2910,7 +2910,7 @@
           <a:p>
             <a:fld id="{A69FEF66-3E5D-456B-B12D-7D7311CE5BD0}" type="datetimeFigureOut">
               <a:rPr lang="fr-FR" smtClean="0"/>
-              <a:t>17/01/2021</a:t>
+              <a:t>15/03/2021</a:t>
             </a:fld>
             <a:endParaRPr lang="fr-FR"/>
           </a:p>
@@ -4302,7 +4302,7 @@
           <a:p>
             <a:r>
               <a:rPr lang="fr-FR" dirty="0"/>
-              <a:t>3.3 Rédaction du rapport finale</a:t>
+              <a:t>3.3 Rédaction du rapport final</a:t>
             </a:r>
           </a:p>
         </p:txBody>
@@ -6021,550 +6021,6 @@
       </p:grpSpPr>
       <p:sp>
         <p:nvSpPr>
-          <p:cNvPr id="100" name="Rectangle : coins arrondis 99">
-            <a:extLst>
-              <a:ext uri="{FF2B5EF4-FFF2-40B4-BE49-F238E27FC236}">
-                <a16:creationId xmlns:a16="http://schemas.microsoft.com/office/drawing/2014/main" id="{13CEA5F8-FB2F-4DFF-8CD5-B4D34F864A7F}"/>
-              </a:ext>
-            </a:extLst>
-          </p:cNvPr>
-          <p:cNvSpPr/>
-          <p:nvPr/>
-        </p:nvSpPr>
-        <p:spPr>
-          <a:xfrm>
-            <a:off x="8617670" y="2269718"/>
-            <a:ext cx="1770670" cy="646331"/>
-          </a:xfrm>
-          <a:prstGeom prst="roundRect">
-            <a:avLst/>
-          </a:prstGeom>
-          <a:solidFill>
-            <a:srgbClr val="FA7260"/>
-          </a:solidFill>
-          <a:ln>
-            <a:noFill/>
-          </a:ln>
-        </p:spPr>
-        <p:style>
-          <a:lnRef idx="2">
-            <a:schemeClr val="accent1">
-              <a:shade val="50000"/>
-            </a:schemeClr>
-          </a:lnRef>
-          <a:fillRef idx="1">
-            <a:schemeClr val="accent1"/>
-          </a:fillRef>
-          <a:effectRef idx="0">
-            <a:schemeClr val="accent1"/>
-          </a:effectRef>
-          <a:fontRef idx="minor">
-            <a:schemeClr val="lt1"/>
-          </a:fontRef>
-        </p:style>
-        <p:txBody>
-          <a:bodyPr rtlCol="0" anchor="ctr"/>
-          <a:lstStyle/>
-          <a:p>
-            <a:pPr algn="ctr"/>
-            <a:endParaRPr lang="fr-FR"/>
-          </a:p>
-        </p:txBody>
-      </p:sp>
-      <p:sp>
-        <p:nvSpPr>
-          <p:cNvPr id="99" name="Rectangle : coins arrondis 98">
-            <a:extLst>
-              <a:ext uri="{FF2B5EF4-FFF2-40B4-BE49-F238E27FC236}">
-                <a16:creationId xmlns:a16="http://schemas.microsoft.com/office/drawing/2014/main" id="{911C69AB-1FEF-4C40-8764-F411B36EB44A}"/>
-              </a:ext>
-            </a:extLst>
-          </p:cNvPr>
-          <p:cNvSpPr/>
-          <p:nvPr/>
-        </p:nvSpPr>
-        <p:spPr>
-          <a:xfrm>
-            <a:off x="4598877" y="2251583"/>
-            <a:ext cx="2788657" cy="919202"/>
-          </a:xfrm>
-          <a:prstGeom prst="roundRect">
-            <a:avLst/>
-          </a:prstGeom>
-          <a:solidFill>
-            <a:srgbClr val="FA7260"/>
-          </a:solidFill>
-          <a:ln>
-            <a:noFill/>
-          </a:ln>
-        </p:spPr>
-        <p:style>
-          <a:lnRef idx="2">
-            <a:schemeClr val="accent1">
-              <a:shade val="50000"/>
-            </a:schemeClr>
-          </a:lnRef>
-          <a:fillRef idx="1">
-            <a:schemeClr val="accent1"/>
-          </a:fillRef>
-          <a:effectRef idx="0">
-            <a:schemeClr val="accent1"/>
-          </a:effectRef>
-          <a:fontRef idx="minor">
-            <a:schemeClr val="lt1"/>
-          </a:fontRef>
-        </p:style>
-        <p:txBody>
-          <a:bodyPr rtlCol="0" anchor="ctr"/>
-          <a:lstStyle/>
-          <a:p>
-            <a:pPr algn="ctr"/>
-            <a:endParaRPr lang="fr-FR"/>
-          </a:p>
-        </p:txBody>
-      </p:sp>
-      <p:sp>
-        <p:nvSpPr>
-          <p:cNvPr id="98" name="Rectangle : coins arrondis 97">
-            <a:extLst>
-              <a:ext uri="{FF2B5EF4-FFF2-40B4-BE49-F238E27FC236}">
-                <a16:creationId xmlns:a16="http://schemas.microsoft.com/office/drawing/2014/main" id="{613EFD8B-14B3-4A19-B220-CE32C4226361}"/>
-              </a:ext>
-            </a:extLst>
-          </p:cNvPr>
-          <p:cNvSpPr/>
-          <p:nvPr/>
-        </p:nvSpPr>
-        <p:spPr>
-          <a:xfrm>
-            <a:off x="8609815" y="1308477"/>
-            <a:ext cx="2042459" cy="638074"/>
-          </a:xfrm>
-          <a:prstGeom prst="roundRect">
-            <a:avLst/>
-          </a:prstGeom>
-          <a:solidFill>
-            <a:schemeClr val="accent4">
-              <a:lumMod val="60000"/>
-              <a:lumOff val="40000"/>
-            </a:schemeClr>
-          </a:solidFill>
-          <a:ln>
-            <a:noFill/>
-          </a:ln>
-        </p:spPr>
-        <p:style>
-          <a:lnRef idx="2">
-            <a:schemeClr val="accent1">
-              <a:shade val="50000"/>
-            </a:schemeClr>
-          </a:lnRef>
-          <a:fillRef idx="1">
-            <a:schemeClr val="accent1"/>
-          </a:fillRef>
-          <a:effectRef idx="0">
-            <a:schemeClr val="accent1"/>
-          </a:effectRef>
-          <a:fontRef idx="minor">
-            <a:schemeClr val="lt1"/>
-          </a:fontRef>
-        </p:style>
-        <p:txBody>
-          <a:bodyPr rtlCol="0" anchor="ctr"/>
-          <a:lstStyle/>
-          <a:p>
-            <a:pPr algn="ctr"/>
-            <a:endParaRPr lang="fr-FR"/>
-          </a:p>
-        </p:txBody>
-      </p:sp>
-      <p:sp>
-        <p:nvSpPr>
-          <p:cNvPr id="97" name="Rectangle : coins arrondis 96">
-            <a:extLst>
-              <a:ext uri="{FF2B5EF4-FFF2-40B4-BE49-F238E27FC236}">
-                <a16:creationId xmlns:a16="http://schemas.microsoft.com/office/drawing/2014/main" id="{A7CFCC04-8776-4F2F-8E48-3E5C8B7CBE13}"/>
-              </a:ext>
-            </a:extLst>
-          </p:cNvPr>
-          <p:cNvSpPr/>
-          <p:nvPr/>
-        </p:nvSpPr>
-        <p:spPr>
-          <a:xfrm>
-            <a:off x="4604996" y="1308477"/>
-            <a:ext cx="1491004" cy="638074"/>
-          </a:xfrm>
-          <a:prstGeom prst="roundRect">
-            <a:avLst/>
-          </a:prstGeom>
-          <a:solidFill>
-            <a:schemeClr val="accent4">
-              <a:lumMod val="60000"/>
-              <a:lumOff val="40000"/>
-            </a:schemeClr>
-          </a:solidFill>
-          <a:ln>
-            <a:noFill/>
-          </a:ln>
-        </p:spPr>
-        <p:style>
-          <a:lnRef idx="2">
-            <a:schemeClr val="accent1">
-              <a:shade val="50000"/>
-            </a:schemeClr>
-          </a:lnRef>
-          <a:fillRef idx="1">
-            <a:schemeClr val="accent1"/>
-          </a:fillRef>
-          <a:effectRef idx="0">
-            <a:schemeClr val="accent1"/>
-          </a:effectRef>
-          <a:fontRef idx="minor">
-            <a:schemeClr val="lt1"/>
-          </a:fontRef>
-        </p:style>
-        <p:txBody>
-          <a:bodyPr rtlCol="0" anchor="ctr"/>
-          <a:lstStyle/>
-          <a:p>
-            <a:pPr algn="ctr"/>
-            <a:endParaRPr lang="fr-FR"/>
-          </a:p>
-        </p:txBody>
-      </p:sp>
-      <p:sp>
-        <p:nvSpPr>
-          <p:cNvPr id="92" name="Rectangle : coins arrondis 91">
-            <a:extLst>
-              <a:ext uri="{FF2B5EF4-FFF2-40B4-BE49-F238E27FC236}">
-                <a16:creationId xmlns:a16="http://schemas.microsoft.com/office/drawing/2014/main" id="{8AE11F07-63B6-4D8D-B922-CE0926902646}"/>
-              </a:ext>
-            </a:extLst>
-          </p:cNvPr>
-          <p:cNvSpPr/>
-          <p:nvPr/>
-        </p:nvSpPr>
-        <p:spPr>
-          <a:xfrm>
-            <a:off x="8617669" y="515401"/>
-            <a:ext cx="2468253" cy="601043"/>
-          </a:xfrm>
-          <a:prstGeom prst="roundRect">
-            <a:avLst/>
-          </a:prstGeom>
-          <a:solidFill>
-            <a:schemeClr val="accent6">
-              <a:lumMod val="60000"/>
-              <a:lumOff val="40000"/>
-            </a:schemeClr>
-          </a:solidFill>
-          <a:ln>
-            <a:noFill/>
-          </a:ln>
-        </p:spPr>
-        <p:style>
-          <a:lnRef idx="2">
-            <a:schemeClr val="accent1">
-              <a:shade val="50000"/>
-            </a:schemeClr>
-          </a:lnRef>
-          <a:fillRef idx="1">
-            <a:schemeClr val="accent1"/>
-          </a:fillRef>
-          <a:effectRef idx="0">
-            <a:schemeClr val="accent1"/>
-          </a:effectRef>
-          <a:fontRef idx="minor">
-            <a:schemeClr val="lt1"/>
-          </a:fontRef>
-        </p:style>
-        <p:txBody>
-          <a:bodyPr rtlCol="0" anchor="ctr"/>
-          <a:lstStyle/>
-          <a:p>
-            <a:pPr algn="ctr"/>
-            <a:endParaRPr lang="fr-FR"/>
-          </a:p>
-        </p:txBody>
-      </p:sp>
-      <p:sp>
-        <p:nvSpPr>
-          <p:cNvPr id="91" name="Rectangle : coins arrondis 90">
-            <a:extLst>
-              <a:ext uri="{FF2B5EF4-FFF2-40B4-BE49-F238E27FC236}">
-                <a16:creationId xmlns:a16="http://schemas.microsoft.com/office/drawing/2014/main" id="{A4DFCF50-C294-4ECA-A571-0D4B3192FD2F}"/>
-              </a:ext>
-            </a:extLst>
-          </p:cNvPr>
-          <p:cNvSpPr/>
-          <p:nvPr/>
-        </p:nvSpPr>
-        <p:spPr>
-          <a:xfrm>
-            <a:off x="4604997" y="646321"/>
-            <a:ext cx="1280471" cy="349542"/>
-          </a:xfrm>
-          <a:prstGeom prst="roundRect">
-            <a:avLst/>
-          </a:prstGeom>
-          <a:solidFill>
-            <a:schemeClr val="accent6">
-              <a:lumMod val="60000"/>
-              <a:lumOff val="40000"/>
-            </a:schemeClr>
-          </a:solidFill>
-          <a:ln>
-            <a:noFill/>
-          </a:ln>
-        </p:spPr>
-        <p:style>
-          <a:lnRef idx="2">
-            <a:schemeClr val="accent1">
-              <a:shade val="50000"/>
-            </a:schemeClr>
-          </a:lnRef>
-          <a:fillRef idx="1">
-            <a:schemeClr val="accent1"/>
-          </a:fillRef>
-          <a:effectRef idx="0">
-            <a:schemeClr val="accent1"/>
-          </a:effectRef>
-          <a:fontRef idx="minor">
-            <a:schemeClr val="lt1"/>
-          </a:fontRef>
-        </p:style>
-        <p:txBody>
-          <a:bodyPr rtlCol="0" anchor="ctr"/>
-          <a:lstStyle/>
-          <a:p>
-            <a:pPr algn="ctr"/>
-            <a:endParaRPr lang="fr-FR"/>
-          </a:p>
-        </p:txBody>
-      </p:sp>
-      <p:sp>
-        <p:nvSpPr>
-          <p:cNvPr id="78" name="Rectangle : coins arrondis 77">
-            <a:extLst>
-              <a:ext uri="{FF2B5EF4-FFF2-40B4-BE49-F238E27FC236}">
-                <a16:creationId xmlns:a16="http://schemas.microsoft.com/office/drawing/2014/main" id="{244282A9-6777-434A-8FCF-1D3C7B2E9940}"/>
-              </a:ext>
-            </a:extLst>
-          </p:cNvPr>
-          <p:cNvSpPr/>
-          <p:nvPr/>
-        </p:nvSpPr>
-        <p:spPr>
-          <a:xfrm>
-            <a:off x="846060" y="3005343"/>
-            <a:ext cx="1736884" cy="593775"/>
-          </a:xfrm>
-          <a:prstGeom prst="roundRect">
-            <a:avLst/>
-          </a:prstGeom>
-          <a:solidFill>
-            <a:schemeClr val="accent6">
-              <a:lumMod val="60000"/>
-              <a:lumOff val="40000"/>
-            </a:schemeClr>
-          </a:solidFill>
-          <a:ln>
-            <a:noFill/>
-          </a:ln>
-        </p:spPr>
-        <p:style>
-          <a:lnRef idx="2">
-            <a:schemeClr val="accent1">
-              <a:shade val="50000"/>
-            </a:schemeClr>
-          </a:lnRef>
-          <a:fillRef idx="1">
-            <a:schemeClr val="accent1"/>
-          </a:fillRef>
-          <a:effectRef idx="0">
-            <a:schemeClr val="accent1"/>
-          </a:effectRef>
-          <a:fontRef idx="minor">
-            <a:schemeClr val="lt1"/>
-          </a:fontRef>
-        </p:style>
-        <p:txBody>
-          <a:bodyPr rtlCol="0" anchor="ctr"/>
-          <a:lstStyle/>
-          <a:p>
-            <a:pPr algn="ctr"/>
-            <a:endParaRPr lang="fr-FR"/>
-          </a:p>
-        </p:txBody>
-      </p:sp>
-      <p:sp>
-        <p:nvSpPr>
-          <p:cNvPr id="77" name="Rectangle : coins arrondis 76">
-            <a:extLst>
-              <a:ext uri="{FF2B5EF4-FFF2-40B4-BE49-F238E27FC236}">
-                <a16:creationId xmlns:a16="http://schemas.microsoft.com/office/drawing/2014/main" id="{CCFADC45-079F-4100-80A3-30B627B60EE7}"/>
-              </a:ext>
-            </a:extLst>
-          </p:cNvPr>
-          <p:cNvSpPr/>
-          <p:nvPr/>
-        </p:nvSpPr>
-        <p:spPr>
-          <a:xfrm>
-            <a:off x="846060" y="2287899"/>
-            <a:ext cx="2344194" cy="369332"/>
-          </a:xfrm>
-          <a:prstGeom prst="roundRect">
-            <a:avLst/>
-          </a:prstGeom>
-          <a:solidFill>
-            <a:schemeClr val="accent6">
-              <a:lumMod val="60000"/>
-              <a:lumOff val="40000"/>
-            </a:schemeClr>
-          </a:solidFill>
-          <a:ln>
-            <a:noFill/>
-          </a:ln>
-        </p:spPr>
-        <p:style>
-          <a:lnRef idx="2">
-            <a:schemeClr val="accent1">
-              <a:shade val="50000"/>
-            </a:schemeClr>
-          </a:lnRef>
-          <a:fillRef idx="1">
-            <a:schemeClr val="accent1"/>
-          </a:fillRef>
-          <a:effectRef idx="0">
-            <a:schemeClr val="accent1"/>
-          </a:effectRef>
-          <a:fontRef idx="minor">
-            <a:schemeClr val="lt1"/>
-          </a:fontRef>
-        </p:style>
-        <p:txBody>
-          <a:bodyPr rtlCol="0" anchor="ctr"/>
-          <a:lstStyle/>
-          <a:p>
-            <a:pPr algn="ctr"/>
-            <a:endParaRPr lang="fr-FR"/>
-          </a:p>
-        </p:txBody>
-      </p:sp>
-      <p:sp>
-        <p:nvSpPr>
-          <p:cNvPr id="75" name="Rectangle : coins arrondis 74">
-            <a:extLst>
-              <a:ext uri="{FF2B5EF4-FFF2-40B4-BE49-F238E27FC236}">
-                <a16:creationId xmlns:a16="http://schemas.microsoft.com/office/drawing/2014/main" id="{75F26431-0F9E-4858-9FA8-4895BCF01522}"/>
-              </a:ext>
-            </a:extLst>
-          </p:cNvPr>
-          <p:cNvSpPr/>
-          <p:nvPr/>
-        </p:nvSpPr>
-        <p:spPr>
-          <a:xfrm>
-            <a:off x="850915" y="1308476"/>
-            <a:ext cx="1537046" cy="638075"/>
-          </a:xfrm>
-          <a:prstGeom prst="roundRect">
-            <a:avLst/>
-          </a:prstGeom>
-          <a:solidFill>
-            <a:schemeClr val="accent6">
-              <a:lumMod val="60000"/>
-              <a:lumOff val="40000"/>
-            </a:schemeClr>
-          </a:solidFill>
-          <a:ln>
-            <a:noFill/>
-          </a:ln>
-        </p:spPr>
-        <p:style>
-          <a:lnRef idx="2">
-            <a:schemeClr val="accent1">
-              <a:shade val="50000"/>
-            </a:schemeClr>
-          </a:lnRef>
-          <a:fillRef idx="1">
-            <a:schemeClr val="accent1"/>
-          </a:fillRef>
-          <a:effectRef idx="0">
-            <a:schemeClr val="accent1"/>
-          </a:effectRef>
-          <a:fontRef idx="minor">
-            <a:schemeClr val="lt1"/>
-          </a:fontRef>
-        </p:style>
-        <p:txBody>
-          <a:bodyPr rtlCol="0" anchor="ctr"/>
-          <a:lstStyle/>
-          <a:p>
-            <a:pPr algn="ctr"/>
-            <a:endParaRPr lang="fr-FR"/>
-          </a:p>
-        </p:txBody>
-      </p:sp>
-      <p:sp>
-        <p:nvSpPr>
-          <p:cNvPr id="40" name="Rectangle : coins arrondis 39">
-            <a:extLst>
-              <a:ext uri="{FF2B5EF4-FFF2-40B4-BE49-F238E27FC236}">
-                <a16:creationId xmlns:a16="http://schemas.microsoft.com/office/drawing/2014/main" id="{2C25A248-BBDD-4DE8-9149-0F9FAD20B788}"/>
-              </a:ext>
-            </a:extLst>
-          </p:cNvPr>
-          <p:cNvSpPr/>
-          <p:nvPr/>
-        </p:nvSpPr>
-        <p:spPr>
-          <a:xfrm>
-            <a:off x="853128" y="674601"/>
-            <a:ext cx="1280471" cy="349542"/>
-          </a:xfrm>
-          <a:prstGeom prst="roundRect">
-            <a:avLst/>
-          </a:prstGeom>
-          <a:solidFill>
-            <a:schemeClr val="accent6">
-              <a:lumMod val="60000"/>
-              <a:lumOff val="40000"/>
-            </a:schemeClr>
-          </a:solidFill>
-          <a:ln>
-            <a:noFill/>
-          </a:ln>
-        </p:spPr>
-        <p:style>
-          <a:lnRef idx="2">
-            <a:schemeClr val="accent1">
-              <a:shade val="50000"/>
-            </a:schemeClr>
-          </a:lnRef>
-          <a:fillRef idx="1">
-            <a:schemeClr val="accent1"/>
-          </a:fillRef>
-          <a:effectRef idx="0">
-            <a:schemeClr val="accent1"/>
-          </a:effectRef>
-          <a:fontRef idx="minor">
-            <a:schemeClr val="lt1"/>
-          </a:fontRef>
-        </p:style>
-        <p:txBody>
-          <a:bodyPr rtlCol="0" anchor="ctr"/>
-          <a:lstStyle/>
-          <a:p>
-            <a:pPr algn="ctr"/>
-            <a:endParaRPr lang="fr-FR"/>
-          </a:p>
-        </p:txBody>
-      </p:sp>
-      <p:sp>
-        <p:nvSpPr>
           <p:cNvPr id="4" name="ZoneTexte 3">
             <a:extLst>
               <a:ext uri="{FF2B5EF4-FFF2-40B4-BE49-F238E27FC236}">
@@ -6592,11 +6048,7 @@
           <a:lstStyle/>
           <a:p>
             <a:r>
-              <a:rPr lang="fr-FR" b="1" dirty="0">
-                <a:solidFill>
-                  <a:schemeClr val="accent6"/>
-                </a:solidFill>
-              </a:rPr>
+              <a:rPr lang="fr-FR" b="1" dirty="0"/>
               <a:t>1. Panorama</a:t>
             </a:r>
           </a:p>
@@ -6631,11 +6083,7 @@
           <a:lstStyle/>
           <a:p>
             <a:r>
-              <a:rPr lang="fr-FR" b="1" dirty="0">
-                <a:solidFill>
-                  <a:srgbClr val="F9A307"/>
-                </a:solidFill>
-              </a:rPr>
+              <a:rPr lang="fr-FR" b="1" dirty="0"/>
               <a:t>2. Générateur</a:t>
             </a:r>
           </a:p>
@@ -6670,11 +6118,7 @@
           <a:lstStyle/>
           <a:p>
             <a:r>
-              <a:rPr lang="fr-FR" b="1" dirty="0">
-                <a:solidFill>
-                  <a:srgbClr val="F9A307"/>
-                </a:solidFill>
-              </a:rPr>
+              <a:rPr lang="fr-FR" b="1" dirty="0"/>
               <a:t>3. Rapports &amp; Soutenances</a:t>
             </a:r>
           </a:p>
@@ -6694,7 +6138,7 @@
         </p:nvSpPr>
         <p:spPr>
           <a:xfrm>
-            <a:off x="822634" y="649203"/>
+            <a:off x="802095" y="626531"/>
             <a:ext cx="1970202" cy="369332"/>
           </a:xfrm>
           <a:prstGeom prst="rect">
@@ -6729,7 +6173,7 @@
         </p:nvSpPr>
         <p:spPr>
           <a:xfrm>
-            <a:off x="816513" y="1300222"/>
+            <a:off x="805825" y="1315251"/>
             <a:ext cx="2450969" cy="646331"/>
           </a:xfrm>
           <a:prstGeom prst="rect">
@@ -6764,7 +6208,7 @@
         </p:nvSpPr>
         <p:spPr>
           <a:xfrm>
-            <a:off x="815420" y="2269718"/>
+            <a:off x="805235" y="2259565"/>
             <a:ext cx="2703921" cy="369332"/>
           </a:xfrm>
           <a:prstGeom prst="rect">
@@ -6799,7 +6243,7 @@
         </p:nvSpPr>
         <p:spPr>
           <a:xfrm>
-            <a:off x="4586759" y="627467"/>
+            <a:off x="4536957" y="626531"/>
             <a:ext cx="2337847" cy="369332"/>
           </a:xfrm>
           <a:prstGeom prst="rect">
@@ -6834,7 +6278,7 @@
         </p:nvSpPr>
         <p:spPr>
           <a:xfrm>
-            <a:off x="4586759" y="1300221"/>
+            <a:off x="4527221" y="1287857"/>
             <a:ext cx="1857081" cy="646331"/>
           </a:xfrm>
           <a:prstGeom prst="rect">
@@ -6869,7 +6313,7 @@
         </p:nvSpPr>
         <p:spPr>
           <a:xfrm>
-            <a:off x="815420" y="2962214"/>
+            <a:off x="802095" y="2951759"/>
             <a:ext cx="2622222" cy="646331"/>
           </a:xfrm>
           <a:prstGeom prst="rect">
@@ -6904,7 +6348,7 @@
         </p:nvSpPr>
         <p:spPr>
           <a:xfrm>
-            <a:off x="4586759" y="2247455"/>
+            <a:off x="4527221" y="2156807"/>
             <a:ext cx="2960018" cy="923330"/>
           </a:xfrm>
           <a:prstGeom prst="rect">
@@ -6939,7 +6383,7 @@
         </p:nvSpPr>
         <p:spPr>
           <a:xfrm>
-            <a:off x="8617669" y="488498"/>
+            <a:off x="8532350" y="505428"/>
             <a:ext cx="2724346" cy="646331"/>
           </a:xfrm>
           <a:prstGeom prst="rect">
@@ -6974,7 +6418,7 @@
         </p:nvSpPr>
         <p:spPr>
           <a:xfrm>
-            <a:off x="8617669" y="1300221"/>
+            <a:off x="8532350" y="1271909"/>
             <a:ext cx="2636363" cy="646331"/>
           </a:xfrm>
           <a:prstGeom prst="rect">
@@ -7009,7 +6453,7 @@
         </p:nvSpPr>
         <p:spPr>
           <a:xfrm>
-            <a:off x="8617669" y="2247455"/>
+            <a:off x="8532350" y="2201073"/>
             <a:ext cx="2356701" cy="646331"/>
           </a:xfrm>
           <a:prstGeom prst="rect">
@@ -7025,7 +6469,7 @@
           <a:p>
             <a:r>
               <a:rPr lang="fr-FR" dirty="0"/>
-              <a:t>3.3 Rédaction du rapport finale</a:t>
+              <a:t>3.3 Rédaction du rapport final</a:t>
             </a:r>
           </a:p>
         </p:txBody>
@@ -7085,8 +6529,8 @@
         </p:nvCxnSpPr>
         <p:spPr>
           <a:xfrm>
-            <a:off x="8136903" y="324975"/>
-            <a:ext cx="0" cy="2264499"/>
+            <a:off x="8136903" y="372110"/>
+            <a:ext cx="0" cy="2100121"/>
           </a:xfrm>
           <a:prstGeom prst="line">
             <a:avLst/>
@@ -7124,7 +6568,7 @@
         </p:nvCxnSpPr>
         <p:spPr>
           <a:xfrm>
-            <a:off x="4132082" y="324974"/>
+            <a:off x="4132082" y="343828"/>
             <a:ext cx="0" cy="2274644"/>
           </a:xfrm>
           <a:prstGeom prst="line">
@@ -7319,7 +6763,7 @@
         </p:nvCxnSpPr>
         <p:spPr>
           <a:xfrm flipH="1">
-            <a:off x="4132082" y="2580764"/>
+            <a:off x="4132082" y="2599618"/>
             <a:ext cx="395448" cy="0"/>
           </a:xfrm>
           <a:prstGeom prst="line">
@@ -7358,7 +6802,7 @@
         </p:nvCxnSpPr>
         <p:spPr>
           <a:xfrm flipH="1">
-            <a:off x="4132082" y="1624267"/>
+            <a:off x="4132082" y="1633694"/>
             <a:ext cx="395448" cy="0"/>
           </a:xfrm>
           <a:prstGeom prst="line">
@@ -7397,7 +6841,7 @@
         </p:nvCxnSpPr>
         <p:spPr>
           <a:xfrm flipH="1">
-            <a:off x="4132082" y="819167"/>
+            <a:off x="4132082" y="828594"/>
             <a:ext cx="395448" cy="0"/>
           </a:xfrm>
           <a:prstGeom prst="line">
@@ -7436,7 +6880,7 @@
         </p:nvCxnSpPr>
         <p:spPr>
           <a:xfrm flipH="1">
-            <a:off x="8136903" y="769019"/>
+            <a:off x="8136903" y="806727"/>
             <a:ext cx="395448" cy="0"/>
           </a:xfrm>
           <a:prstGeom prst="line">
@@ -7475,7 +6919,7 @@
         </p:nvCxnSpPr>
         <p:spPr>
           <a:xfrm flipH="1">
-            <a:off x="8136903" y="2575928"/>
+            <a:off x="8136903" y="2462804"/>
             <a:ext cx="395448" cy="0"/>
           </a:xfrm>
           <a:prstGeom prst="line">
@@ -7514,7 +6958,7 @@
         </p:nvCxnSpPr>
         <p:spPr>
           <a:xfrm flipH="1">
-            <a:off x="8136903" y="1589801"/>
+            <a:off x="8136903" y="1618082"/>
             <a:ext cx="395448" cy="0"/>
           </a:xfrm>
           <a:prstGeom prst="line">

</xml_diff>

<commit_message>
update répartition et WBS
</commit_message>
<xml_diff>
--- a/Documentation/cahierDesCharges/WBS.pptx
+++ b/Documentation/cahierDesCharges/WBS.pptx
@@ -260,7 +260,7 @@
           <a:p>
             <a:fld id="{A69FEF66-3E5D-456B-B12D-7D7311CE5BD0}" type="datetimeFigureOut">
               <a:rPr lang="fr-FR" smtClean="0"/>
-              <a:t>15/03/2021</a:t>
+              <a:t>26/03/2021</a:t>
             </a:fld>
             <a:endParaRPr lang="fr-FR"/>
           </a:p>
@@ -458,7 +458,7 @@
           <a:p>
             <a:fld id="{A69FEF66-3E5D-456B-B12D-7D7311CE5BD0}" type="datetimeFigureOut">
               <a:rPr lang="fr-FR" smtClean="0"/>
-              <a:t>15/03/2021</a:t>
+              <a:t>26/03/2021</a:t>
             </a:fld>
             <a:endParaRPr lang="fr-FR"/>
           </a:p>
@@ -666,7 +666,7 @@
           <a:p>
             <a:fld id="{A69FEF66-3E5D-456B-B12D-7D7311CE5BD0}" type="datetimeFigureOut">
               <a:rPr lang="fr-FR" smtClean="0"/>
-              <a:t>15/03/2021</a:t>
+              <a:t>26/03/2021</a:t>
             </a:fld>
             <a:endParaRPr lang="fr-FR"/>
           </a:p>
@@ -864,7 +864,7 @@
           <a:p>
             <a:fld id="{A69FEF66-3E5D-456B-B12D-7D7311CE5BD0}" type="datetimeFigureOut">
               <a:rPr lang="fr-FR" smtClean="0"/>
-              <a:t>15/03/2021</a:t>
+              <a:t>26/03/2021</a:t>
             </a:fld>
             <a:endParaRPr lang="fr-FR"/>
           </a:p>
@@ -1139,7 +1139,7 @@
           <a:p>
             <a:fld id="{A69FEF66-3E5D-456B-B12D-7D7311CE5BD0}" type="datetimeFigureOut">
               <a:rPr lang="fr-FR" smtClean="0"/>
-              <a:t>15/03/2021</a:t>
+              <a:t>26/03/2021</a:t>
             </a:fld>
             <a:endParaRPr lang="fr-FR"/>
           </a:p>
@@ -1404,7 +1404,7 @@
           <a:p>
             <a:fld id="{A69FEF66-3E5D-456B-B12D-7D7311CE5BD0}" type="datetimeFigureOut">
               <a:rPr lang="fr-FR" smtClean="0"/>
-              <a:t>15/03/2021</a:t>
+              <a:t>26/03/2021</a:t>
             </a:fld>
             <a:endParaRPr lang="fr-FR"/>
           </a:p>
@@ -1816,7 +1816,7 @@
           <a:p>
             <a:fld id="{A69FEF66-3E5D-456B-B12D-7D7311CE5BD0}" type="datetimeFigureOut">
               <a:rPr lang="fr-FR" smtClean="0"/>
-              <a:t>15/03/2021</a:t>
+              <a:t>26/03/2021</a:t>
             </a:fld>
             <a:endParaRPr lang="fr-FR"/>
           </a:p>
@@ -1957,7 +1957,7 @@
           <a:p>
             <a:fld id="{A69FEF66-3E5D-456B-B12D-7D7311CE5BD0}" type="datetimeFigureOut">
               <a:rPr lang="fr-FR" smtClean="0"/>
-              <a:t>15/03/2021</a:t>
+              <a:t>26/03/2021</a:t>
             </a:fld>
             <a:endParaRPr lang="fr-FR"/>
           </a:p>
@@ -2070,7 +2070,7 @@
           <a:p>
             <a:fld id="{A69FEF66-3E5D-456B-B12D-7D7311CE5BD0}" type="datetimeFigureOut">
               <a:rPr lang="fr-FR" smtClean="0"/>
-              <a:t>15/03/2021</a:t>
+              <a:t>26/03/2021</a:t>
             </a:fld>
             <a:endParaRPr lang="fr-FR"/>
           </a:p>
@@ -2381,7 +2381,7 @@
           <a:p>
             <a:fld id="{A69FEF66-3E5D-456B-B12D-7D7311CE5BD0}" type="datetimeFigureOut">
               <a:rPr lang="fr-FR" smtClean="0"/>
-              <a:t>15/03/2021</a:t>
+              <a:t>26/03/2021</a:t>
             </a:fld>
             <a:endParaRPr lang="fr-FR"/>
           </a:p>
@@ -2669,7 +2669,7 @@
           <a:p>
             <a:fld id="{A69FEF66-3E5D-456B-B12D-7D7311CE5BD0}" type="datetimeFigureOut">
               <a:rPr lang="fr-FR" smtClean="0"/>
-              <a:t>15/03/2021</a:t>
+              <a:t>26/03/2021</a:t>
             </a:fld>
             <a:endParaRPr lang="fr-FR"/>
           </a:p>
@@ -2910,7 +2910,7 @@
           <a:p>
             <a:fld id="{A69FEF66-3E5D-456B-B12D-7D7311CE5BD0}" type="datetimeFigureOut">
               <a:rPr lang="fr-FR" smtClean="0"/>
-              <a:t>15/03/2021</a:t>
+              <a:t>26/03/2021</a:t>
             </a:fld>
             <a:endParaRPr lang="fr-FR"/>
           </a:p>
@@ -3342,7 +3342,7 @@
         <p:spPr>
           <a:xfrm>
             <a:off x="243525" y="0"/>
-            <a:ext cx="1486293" cy="369333"/>
+            <a:ext cx="1648902" cy="369333"/>
           </a:xfrm>
           <a:prstGeom prst="rect">
             <a:avLst/>
@@ -3356,7 +3356,7 @@
           <a:lstStyle/>
           <a:p>
             <a:r>
-              <a:rPr lang="fr-FR" dirty="0"/>
+              <a:rPr lang="fr-FR" b="1" dirty="0"/>
               <a:t>1. Panorama</a:t>
             </a:r>
           </a:p>
@@ -3377,7 +3377,7 @@
         <p:spPr>
           <a:xfrm>
             <a:off x="3950616" y="0"/>
-            <a:ext cx="1486293" cy="369332"/>
+            <a:ext cx="1648902" cy="369332"/>
           </a:xfrm>
           <a:prstGeom prst="rect">
             <a:avLst/>
@@ -3391,7 +3391,7 @@
           <a:lstStyle/>
           <a:p>
             <a:r>
-              <a:rPr lang="fr-FR" dirty="0"/>
+              <a:rPr lang="fr-FR" b="1" dirty="0"/>
               <a:t>2. Générateur</a:t>
             </a:r>
           </a:p>
@@ -3411,8 +3411,8 @@
         </p:nvSpPr>
         <p:spPr>
           <a:xfrm>
-            <a:off x="7927942" y="0"/>
-            <a:ext cx="2724346" cy="369332"/>
+            <a:off x="7927941" y="0"/>
+            <a:ext cx="3022405" cy="369332"/>
           </a:xfrm>
           <a:prstGeom prst="rect">
             <a:avLst/>
@@ -3426,7 +3426,7 @@
           <a:lstStyle/>
           <a:p>
             <a:r>
-              <a:rPr lang="fr-FR" dirty="0"/>
+              <a:rPr lang="fr-FR" b="1" dirty="0"/>
               <a:t>3. Rapports &amp; Soutenances</a:t>
             </a:r>
           </a:p>

</xml_diff>